<commit_message>
Added more lower resolution cubes.
</commit_message>
<xml_diff>
--- a/PixarGPUSiggraphAsia2012.pptx
+++ b/PixarGPUSiggraphAsia2012.pptx
@@ -244,7 +244,7 @@
           <a:p>
             <a:fld id="{48917AE9-D1E6-42BE-AB65-4DE8C00F1A07}" type="datetimeFigureOut">
               <a:rPr lang="en-US" smtClean="0"/>
-              <a:t>11/29/2012</a:t>
+              <a:t>11/30/2012</a:t>
             </a:fld>
             <a:endParaRPr lang="en-US"/>
           </a:p>
@@ -1617,29 +1617,17 @@
             </a:r>
             <a:r>
               <a:rPr lang="en-US" baseline="0" dirty="0" smtClean="0"/>
-              <a:t> out of </a:t>
+              <a:t> out of date.</a:t>
+            </a:r>
+          </a:p>
+          <a:p>
+            <a:r>
+              <a:rPr lang="en-US" dirty="0" smtClean="0"/>
+              <a:t>This will be updated</a:t>
             </a:r>
             <a:r>
               <a:rPr lang="en-US" baseline="0" dirty="0" smtClean="0"/>
-              <a:t>date.</a:t>
-            </a:r>
-          </a:p>
-          <a:p>
-            <a:r>
-              <a:rPr lang="en-US" dirty="0" smtClean="0"/>
-              <a:t>This </a:t>
-            </a:r>
-            <a:r>
-              <a:rPr lang="en-US" dirty="0" smtClean="0"/>
-              <a:t>will be updated</a:t>
-            </a:r>
-            <a:r>
-              <a:rPr lang="en-US" baseline="0" dirty="0" smtClean="0"/>
-              <a:t> tomorrow with the source currently on my machine</a:t>
-            </a:r>
-            <a:r>
-              <a:rPr lang="en-US" baseline="0" dirty="0" smtClean="0"/>
-              <a:t>.</a:t>
+              <a:t> tomorrow with the source currently on my machine.</a:t>
             </a:r>
           </a:p>
           <a:p>
@@ -6621,7 +6609,7 @@
           <a:p>
             <a:fld id="{26EF8D39-A139-4B16-8E4B-A36B31699D6A}" type="datetimeFigureOut">
               <a:rPr lang="en-US" smtClean="0"/>
-              <a:t>11/29/2012</a:t>
+              <a:t>11/30/2012</a:t>
             </a:fld>
             <a:endParaRPr lang="en-US"/>
           </a:p>
@@ -6791,7 +6779,7 @@
           <a:p>
             <a:fld id="{26EF8D39-A139-4B16-8E4B-A36B31699D6A}" type="datetimeFigureOut">
               <a:rPr lang="en-US" smtClean="0"/>
-              <a:t>11/29/2012</a:t>
+              <a:t>11/30/2012</a:t>
             </a:fld>
             <a:endParaRPr lang="en-US"/>
           </a:p>
@@ -6971,7 +6959,7 @@
           <a:p>
             <a:fld id="{26EF8D39-A139-4B16-8E4B-A36B31699D6A}" type="datetimeFigureOut">
               <a:rPr lang="en-US" smtClean="0"/>
-              <a:t>11/29/2012</a:t>
+              <a:t>11/30/2012</a:t>
             </a:fld>
             <a:endParaRPr lang="en-US"/>
           </a:p>
@@ -7141,7 +7129,7 @@
           <a:p>
             <a:fld id="{26EF8D39-A139-4B16-8E4B-A36B31699D6A}" type="datetimeFigureOut">
               <a:rPr lang="en-US" smtClean="0"/>
-              <a:t>11/29/2012</a:t>
+              <a:t>11/30/2012</a:t>
             </a:fld>
             <a:endParaRPr lang="en-US"/>
           </a:p>
@@ -7387,7 +7375,7 @@
           <a:p>
             <a:fld id="{26EF8D39-A139-4B16-8E4B-A36B31699D6A}" type="datetimeFigureOut">
               <a:rPr lang="en-US" smtClean="0"/>
-              <a:t>11/29/2012</a:t>
+              <a:t>11/30/2012</a:t>
             </a:fld>
             <a:endParaRPr lang="en-US"/>
           </a:p>
@@ -7675,7 +7663,7 @@
           <a:p>
             <a:fld id="{26EF8D39-A139-4B16-8E4B-A36B31699D6A}" type="datetimeFigureOut">
               <a:rPr lang="en-US" smtClean="0"/>
-              <a:t>11/29/2012</a:t>
+              <a:t>11/30/2012</a:t>
             </a:fld>
             <a:endParaRPr lang="en-US"/>
           </a:p>
@@ -8097,7 +8085,7 @@
           <a:p>
             <a:fld id="{26EF8D39-A139-4B16-8E4B-A36B31699D6A}" type="datetimeFigureOut">
               <a:rPr lang="en-US" smtClean="0"/>
-              <a:t>11/29/2012</a:t>
+              <a:t>11/30/2012</a:t>
             </a:fld>
             <a:endParaRPr lang="en-US"/>
           </a:p>
@@ -8215,7 +8203,7 @@
           <a:p>
             <a:fld id="{26EF8D39-A139-4B16-8E4B-A36B31699D6A}" type="datetimeFigureOut">
               <a:rPr lang="en-US" smtClean="0"/>
-              <a:t>11/29/2012</a:t>
+              <a:t>11/30/2012</a:t>
             </a:fld>
             <a:endParaRPr lang="en-US"/>
           </a:p>
@@ -8310,7 +8298,7 @@
           <a:p>
             <a:fld id="{26EF8D39-A139-4B16-8E4B-A36B31699D6A}" type="datetimeFigureOut">
               <a:rPr lang="en-US" smtClean="0"/>
-              <a:t>11/29/2012</a:t>
+              <a:t>11/30/2012</a:t>
             </a:fld>
             <a:endParaRPr lang="en-US"/>
           </a:p>
@@ -8587,7 +8575,7 @@
           <a:p>
             <a:fld id="{26EF8D39-A139-4B16-8E4B-A36B31699D6A}" type="datetimeFigureOut">
               <a:rPr lang="en-US" smtClean="0"/>
-              <a:t>11/29/2012</a:t>
+              <a:t>11/30/2012</a:t>
             </a:fld>
             <a:endParaRPr lang="en-US"/>
           </a:p>
@@ -8840,7 +8828,7 @@
           <a:p>
             <a:fld id="{26EF8D39-A139-4B16-8E4B-A36B31699D6A}" type="datetimeFigureOut">
               <a:rPr lang="en-US" smtClean="0"/>
-              <a:t>11/29/2012</a:t>
+              <a:t>11/30/2012</a:t>
             </a:fld>
             <a:endParaRPr lang="en-US"/>
           </a:p>
@@ -9068,7 +9056,7 @@
           <a:p>
             <a:fld id="{26EF8D39-A139-4B16-8E4B-A36B31699D6A}" type="datetimeFigureOut">
               <a:rPr lang="en-US" smtClean="0"/>
-              <a:t>11/29/2012</a:t>
+              <a:t>11/30/2012</a:t>
             </a:fld>
             <a:endParaRPr lang="en-US"/>
           </a:p>
@@ -10996,11 +10984,7 @@
           <a:p>
             <a:r>
               <a:rPr lang="en-US" dirty="0" smtClean="0"/>
-              <a:t>GNU GPL </a:t>
-            </a:r>
-            <a:r>
-              <a:rPr lang="en-US" dirty="0" smtClean="0"/>
-              <a:t>License</a:t>
+              <a:t>GNU GPL License</a:t>
             </a:r>
           </a:p>
         </p:txBody>
@@ -16848,25 +16832,13 @@
         <p:spPr/>
         <p:txBody>
           <a:bodyPr>
-            <a:normAutofit fontScale="85000" lnSpcReduction="10000"/>
+            <a:normAutofit fontScale="77500" lnSpcReduction="20000"/>
           </a:bodyPr>
           <a:lstStyle/>
           <a:p>
             <a:r>
               <a:rPr lang="en-US" dirty="0" smtClean="0"/>
-              <a:t>Runs </a:t>
-            </a:r>
-            <a:r>
-              <a:rPr lang="en-US" dirty="0" smtClean="0"/>
-              <a:t>at 30 fps</a:t>
-            </a:r>
-            <a:r>
-              <a:rPr lang="en-US" dirty="0" smtClean="0"/>
-              <a:t> </a:t>
-            </a:r>
-            <a:r>
-              <a:rPr lang="en-US" dirty="0" smtClean="0"/>
-              <a:t>on a </a:t>
+              <a:t>Runs at 30 fps on a </a:t>
             </a:r>
             <a:r>
               <a:rPr lang="en-US" dirty="0" err="1" smtClean="0"/>
@@ -16879,6 +16851,19 @@
             <a:r>
               <a:rPr lang="en-US" dirty="0" smtClean="0"/>
               <a:t>springs</a:t>
+            </a:r>
+          </a:p>
+          <a:p>
+            <a:endParaRPr lang="en-US" dirty="0"/>
+          </a:p>
+          <a:p>
+            <a:r>
+              <a:rPr lang="en-US" dirty="0" smtClean="0"/>
+              <a:t>Creates a plausible real-time simulation with </a:t>
+            </a:r>
+            <a:r>
+              <a:rPr lang="en-US" smtClean="0"/>
+              <a:t>50k springs</a:t>
             </a:r>
             <a:endParaRPr lang="en-US" dirty="0"/>
           </a:p>

</xml_diff>